<commit_message>
Pequena alteração no último slide da pesagem e recálculo
</commit_message>
<xml_diff>
--- a/calculos/Pesagem_e_recalculo.pptx
+++ b/calculos/Pesagem_e_recalculo.pptx
@@ -306,7 +306,7 @@
           <a:p>
             <a:fld id="{A1C4B64B-60EF-487E-9CED-ADA0E5B19193}" type="datetimeFigureOut">
               <a:rPr lang="pt-BR" smtClean="0"/>
-              <a:t>26/01/2021</a:t>
+              <a:t>04/02/2021</a:t>
             </a:fld>
             <a:endParaRPr lang="pt-BR"/>
           </a:p>
@@ -476,7 +476,7 @@
           <a:p>
             <a:fld id="{A1C4B64B-60EF-487E-9CED-ADA0E5B19193}" type="datetimeFigureOut">
               <a:rPr lang="pt-BR" smtClean="0"/>
-              <a:t>26/01/2021</a:t>
+              <a:t>04/02/2021</a:t>
             </a:fld>
             <a:endParaRPr lang="pt-BR"/>
           </a:p>
@@ -656,7 +656,7 @@
           <a:p>
             <a:fld id="{A1C4B64B-60EF-487E-9CED-ADA0E5B19193}" type="datetimeFigureOut">
               <a:rPr lang="pt-BR" smtClean="0"/>
-              <a:t>26/01/2021</a:t>
+              <a:t>04/02/2021</a:t>
             </a:fld>
             <a:endParaRPr lang="pt-BR"/>
           </a:p>
@@ -826,7 +826,7 @@
           <a:p>
             <a:fld id="{A1C4B64B-60EF-487E-9CED-ADA0E5B19193}" type="datetimeFigureOut">
               <a:rPr lang="pt-BR" smtClean="0"/>
-              <a:t>26/01/2021</a:t>
+              <a:t>04/02/2021</a:t>
             </a:fld>
             <a:endParaRPr lang="pt-BR"/>
           </a:p>
@@ -1072,7 +1072,7 @@
           <a:p>
             <a:fld id="{A1C4B64B-60EF-487E-9CED-ADA0E5B19193}" type="datetimeFigureOut">
               <a:rPr lang="pt-BR" smtClean="0"/>
-              <a:t>26/01/2021</a:t>
+              <a:t>04/02/2021</a:t>
             </a:fld>
             <a:endParaRPr lang="pt-BR"/>
           </a:p>
@@ -1360,7 +1360,7 @@
           <a:p>
             <a:fld id="{A1C4B64B-60EF-487E-9CED-ADA0E5B19193}" type="datetimeFigureOut">
               <a:rPr lang="pt-BR" smtClean="0"/>
-              <a:t>26/01/2021</a:t>
+              <a:t>04/02/2021</a:t>
             </a:fld>
             <a:endParaRPr lang="pt-BR"/>
           </a:p>
@@ -1782,7 +1782,7 @@
           <a:p>
             <a:fld id="{A1C4B64B-60EF-487E-9CED-ADA0E5B19193}" type="datetimeFigureOut">
               <a:rPr lang="pt-BR" smtClean="0"/>
-              <a:t>26/01/2021</a:t>
+              <a:t>04/02/2021</a:t>
             </a:fld>
             <a:endParaRPr lang="pt-BR"/>
           </a:p>
@@ -1900,7 +1900,7 @@
           <a:p>
             <a:fld id="{A1C4B64B-60EF-487E-9CED-ADA0E5B19193}" type="datetimeFigureOut">
               <a:rPr lang="pt-BR" smtClean="0"/>
-              <a:t>26/01/2021</a:t>
+              <a:t>04/02/2021</a:t>
             </a:fld>
             <a:endParaRPr lang="pt-BR"/>
           </a:p>
@@ -1995,7 +1995,7 @@
           <a:p>
             <a:fld id="{A1C4B64B-60EF-487E-9CED-ADA0E5B19193}" type="datetimeFigureOut">
               <a:rPr lang="pt-BR" smtClean="0"/>
-              <a:t>26/01/2021</a:t>
+              <a:t>04/02/2021</a:t>
             </a:fld>
             <a:endParaRPr lang="pt-BR"/>
           </a:p>
@@ -2272,7 +2272,7 @@
           <a:p>
             <a:fld id="{A1C4B64B-60EF-487E-9CED-ADA0E5B19193}" type="datetimeFigureOut">
               <a:rPr lang="pt-BR" smtClean="0"/>
-              <a:t>26/01/2021</a:t>
+              <a:t>04/02/2021</a:t>
             </a:fld>
             <a:endParaRPr lang="pt-BR"/>
           </a:p>
@@ -2525,7 +2525,7 @@
           <a:p>
             <a:fld id="{A1C4B64B-60EF-487E-9CED-ADA0E5B19193}" type="datetimeFigureOut">
               <a:rPr lang="pt-BR" smtClean="0"/>
-              <a:t>26/01/2021</a:t>
+              <a:t>04/02/2021</a:t>
             </a:fld>
             <a:endParaRPr lang="pt-BR"/>
           </a:p>
@@ -2738,7 +2738,7 @@
           <a:p>
             <a:fld id="{A1C4B64B-60EF-487E-9CED-ADA0E5B19193}" type="datetimeFigureOut">
               <a:rPr lang="pt-BR" smtClean="0"/>
-              <a:t>26/01/2021</a:t>
+              <a:t>04/02/2021</a:t>
             </a:fld>
             <a:endParaRPr lang="pt-BR"/>
           </a:p>
@@ -6911,11 +6911,7 @@
             </a:r>
             <a:r>
               <a:rPr lang="pt-BR" smtClean="0"/>
-              <a:t>densidade </a:t>
-            </a:r>
-            <a:r>
-              <a:rPr lang="pt-BR" smtClean="0"/>
-              <a:t>que </a:t>
+              <a:t>densidade que </a:t>
             </a:r>
             <a:r>
               <a:rPr lang="pt-BR" dirty="0" smtClean="0"/>
@@ -7205,8 +7201,8 @@
           </a:p>
         </p:txBody>
       </p:sp>
-      <mc:AlternateContent xmlns:mc="http://schemas.openxmlformats.org/markup-compatibility/2006" xmlns:a14="http://schemas.microsoft.com/office/drawing/2010/main">
-        <mc:Choice Requires="a14">
+      <mc:AlternateContent xmlns:mc="http://schemas.openxmlformats.org/markup-compatibility/2006">
+        <mc:Choice xmlns:a14="http://schemas.microsoft.com/office/drawing/2010/main" Requires="a14">
           <p:sp>
             <p:nvSpPr>
               <p:cNvPr id="3" name="Espaço Reservado para Conteúdo 2"/>
@@ -7219,8 +7215,8 @@
             </p:nvSpPr>
             <p:spPr>
               <a:xfrm>
-                <a:off x="457200" y="1600200"/>
-                <a:ext cx="8291264" cy="4853136"/>
+                <a:off x="179512" y="1600200"/>
+                <a:ext cx="8856984" cy="5141168"/>
               </a:xfrm>
             </p:spPr>
             <p:txBody>
@@ -7639,14 +7635,40 @@
               <a:p>
                 <a:r>
                   <a:rPr lang="pt-BR" dirty="0" smtClean="0"/>
-                  <a:t>Dependendo de quanto tempo o servo da junta 1 exerce esforço, é possível que o torque resultante possa, até mesmo, se tornar negativo. </a:t>
+                  <a:t>Dependendo de quanto tempo o servo da junta 1 exerce esforço, é possível que o torque resultante possa, até mesmo, se tornar negativo</a:t>
+                </a:r>
+                <a:r>
+                  <a:rPr lang="pt-BR" dirty="0" smtClean="0"/>
+                  <a:t>.</a:t>
+                </a:r>
+              </a:p>
+              <a:p>
+                <a:r>
+                  <a:rPr lang="pt-BR" dirty="0" smtClean="0"/>
+                  <a:t>Existe, também, a possibilidade do servo da junta 1 não ter só um torque de </a:t>
+                </a:r>
+                <a:r>
+                  <a:rPr lang="pt-BR" dirty="0" err="1" smtClean="0"/>
+                  <a:t>stall</a:t>
+                </a:r>
+                <a:r>
+                  <a:rPr lang="pt-BR" dirty="0" smtClean="0"/>
+                  <a:t>, mas sim uma faixa de torques de </a:t>
+                </a:r>
+                <a:r>
+                  <a:rPr lang="pt-BR" dirty="0" err="1" smtClean="0"/>
+                  <a:t>stall</a:t>
+                </a:r>
+                <a:r>
+                  <a:rPr lang="pt-BR" dirty="0" smtClean="0"/>
+                  <a:t>, que pode ir de 9,48Kg.cm a 11,95Kg.cm, pois, mesmo sem segurar objeto, o braço robô não conseguia sair da posição horizontal.</a:t>
                 </a:r>
                 <a:endParaRPr lang="pt-BR" dirty="0"/>
               </a:p>
             </p:txBody>
           </p:sp>
         </mc:Choice>
-        <mc:Fallback xmlns="">
+        <mc:Fallback>
           <p:sp>
             <p:nvSpPr>
               <p:cNvPr id="3" name="Espaço Reservado para Conteúdo 2"/>
@@ -7659,13 +7681,13 @@
             </p:nvSpPr>
             <p:spPr>
               <a:xfrm>
-                <a:off x="457200" y="1600200"/>
-                <a:ext cx="8291264" cy="4853136"/>
+                <a:off x="179512" y="1600200"/>
+                <a:ext cx="8856984" cy="5141168"/>
               </a:xfrm>
               <a:blipFill rotWithShape="1">
                 <a:blip r:embed="rId2"/>
                 <a:stretch>
-                  <a:fillRect l="-809" t="-2136"/>
+                  <a:fillRect l="-757" t="-2017" r="-1376"/>
                 </a:stretch>
               </a:blipFill>
             </p:spPr>

</xml_diff>